<commit_message>
test 6 - 4 bullet points
test 6 - 4 bullet points
</commit_message>
<xml_diff>
--- a/contributed-data/1_aging_infrastructure/DO NOT USE - test files/Untapped 2018_Datathon Workshop_video.pptx
+++ b/contributed-data/1_aging_infrastructure/DO NOT USE - test files/Untapped 2018_Datathon Workshop_video.pptx
@@ -4704,7 +4704,17 @@
                   <a:schemeClr val="bg1"/>
                 </a:solidFill>
               </a:rPr>
-              <a:t>3. Testing </a:t>
+              <a:t>3. Testing for collaboration on GIT</a:t>
+            </a:r>
+          </a:p>
+          <a:p>
+            <a:r>
+              <a:rPr lang="en-US" sz="1400" dirty="0">
+                <a:solidFill>
+                  <a:schemeClr val="bg1"/>
+                </a:solidFill>
+              </a:rPr>
+              <a:t>4. </a:t>
             </a:r>
             <a:r>
               <a:rPr lang="en-US" sz="1400">
@@ -4712,7 +4722,7 @@
                   <a:schemeClr val="bg1"/>
                 </a:solidFill>
               </a:rPr>
-              <a:t>for collaboration on GIT</a:t>
+              <a:t>Collaboration for test 6</a:t>
             </a:r>
             <a:br>
               <a:rPr lang="en-US" sz="4000" dirty="0">

</xml_diff>